<commit_message>
[PROY-03] Unificación de cambios FrontEnd
</commit_message>
<xml_diff>
--- a/Layout_API-COVID19.pptx
+++ b/Layout_API-COVID19.pptx
@@ -104,6 +104,11 @@
       </a:defRPr>
     </a:lvl9pPr>
   </p:defaultTextStyle>
+  <p:extLst>
+    <p:ext uri="{EFAFB233-063F-42B5-8137-9DF3F51BA10A}">
+      <p15:sldGuideLst xmlns:p15="http://schemas.microsoft.com/office/powerpoint/2012/main"/>
+    </p:ext>
+  </p:extLst>
 </p:presentation>
 </file>
 
@@ -256,7 +261,7 @@
           <a:p>
             <a:fld id="{5339FCD7-4E85-4556-903D-1314FCCEDD74}" type="datetimeFigureOut">
               <a:rPr lang="es-MX" smtClean="0"/>
-              <a:t>21/08/2021</a:t>
+              <a:t>28/08/2021</a:t>
             </a:fld>
             <a:endParaRPr lang="es-MX"/>
           </a:p>
@@ -456,7 +461,7 @@
           <a:p>
             <a:fld id="{5339FCD7-4E85-4556-903D-1314FCCEDD74}" type="datetimeFigureOut">
               <a:rPr lang="es-MX" smtClean="0"/>
-              <a:t>21/08/2021</a:t>
+              <a:t>28/08/2021</a:t>
             </a:fld>
             <a:endParaRPr lang="es-MX"/>
           </a:p>
@@ -666,7 +671,7 @@
           <a:p>
             <a:fld id="{5339FCD7-4E85-4556-903D-1314FCCEDD74}" type="datetimeFigureOut">
               <a:rPr lang="es-MX" smtClean="0"/>
-              <a:t>21/08/2021</a:t>
+              <a:t>28/08/2021</a:t>
             </a:fld>
             <a:endParaRPr lang="es-MX"/>
           </a:p>
@@ -866,7 +871,7 @@
           <a:p>
             <a:fld id="{5339FCD7-4E85-4556-903D-1314FCCEDD74}" type="datetimeFigureOut">
               <a:rPr lang="es-MX" smtClean="0"/>
-              <a:t>21/08/2021</a:t>
+              <a:t>28/08/2021</a:t>
             </a:fld>
             <a:endParaRPr lang="es-MX"/>
           </a:p>
@@ -1142,7 +1147,7 @@
           <a:p>
             <a:fld id="{5339FCD7-4E85-4556-903D-1314FCCEDD74}" type="datetimeFigureOut">
               <a:rPr lang="es-MX" smtClean="0"/>
-              <a:t>21/08/2021</a:t>
+              <a:t>28/08/2021</a:t>
             </a:fld>
             <a:endParaRPr lang="es-MX"/>
           </a:p>
@@ -1410,7 +1415,7 @@
           <a:p>
             <a:fld id="{5339FCD7-4E85-4556-903D-1314FCCEDD74}" type="datetimeFigureOut">
               <a:rPr lang="es-MX" smtClean="0"/>
-              <a:t>21/08/2021</a:t>
+              <a:t>28/08/2021</a:t>
             </a:fld>
             <a:endParaRPr lang="es-MX"/>
           </a:p>
@@ -1825,7 +1830,7 @@
           <a:p>
             <a:fld id="{5339FCD7-4E85-4556-903D-1314FCCEDD74}" type="datetimeFigureOut">
               <a:rPr lang="es-MX" smtClean="0"/>
-              <a:t>21/08/2021</a:t>
+              <a:t>28/08/2021</a:t>
             </a:fld>
             <a:endParaRPr lang="es-MX"/>
           </a:p>
@@ -1967,7 +1972,7 @@
           <a:p>
             <a:fld id="{5339FCD7-4E85-4556-903D-1314FCCEDD74}" type="datetimeFigureOut">
               <a:rPr lang="es-MX" smtClean="0"/>
-              <a:t>21/08/2021</a:t>
+              <a:t>28/08/2021</a:t>
             </a:fld>
             <a:endParaRPr lang="es-MX"/>
           </a:p>
@@ -2080,7 +2085,7 @@
           <a:p>
             <a:fld id="{5339FCD7-4E85-4556-903D-1314FCCEDD74}" type="datetimeFigureOut">
               <a:rPr lang="es-MX" smtClean="0"/>
-              <a:t>21/08/2021</a:t>
+              <a:t>28/08/2021</a:t>
             </a:fld>
             <a:endParaRPr lang="es-MX"/>
           </a:p>
@@ -2393,7 +2398,7 @@
           <a:p>
             <a:fld id="{5339FCD7-4E85-4556-903D-1314FCCEDD74}" type="datetimeFigureOut">
               <a:rPr lang="es-MX" smtClean="0"/>
-              <a:t>21/08/2021</a:t>
+              <a:t>28/08/2021</a:t>
             </a:fld>
             <a:endParaRPr lang="es-MX"/>
           </a:p>
@@ -2682,7 +2687,7 @@
           <a:p>
             <a:fld id="{5339FCD7-4E85-4556-903D-1314FCCEDD74}" type="datetimeFigureOut">
               <a:rPr lang="es-MX" smtClean="0"/>
-              <a:t>21/08/2021</a:t>
+              <a:t>28/08/2021</a:t>
             </a:fld>
             <a:endParaRPr lang="es-MX"/>
           </a:p>
@@ -2925,7 +2930,7 @@
           <a:p>
             <a:fld id="{5339FCD7-4E85-4556-903D-1314FCCEDD74}" type="datetimeFigureOut">
               <a:rPr lang="es-MX" smtClean="0"/>
-              <a:t>21/08/2021</a:t>
+              <a:t>28/08/2021</a:t>
             </a:fld>
             <a:endParaRPr lang="es-MX"/>
           </a:p>
@@ -3344,10 +3349,10 @@
       </p:grpSpPr>
       <p:sp>
         <p:nvSpPr>
-          <p:cNvPr id="4" name="Rectángulo 3">
-            <a:extLst>
-              <a:ext uri="{FF2B5EF4-FFF2-40B4-BE49-F238E27FC236}">
-                <a16:creationId xmlns:a16="http://schemas.microsoft.com/office/drawing/2014/main" id="{5C755673-F202-4B03-849F-035CFCF675CB}"/>
+          <p:cNvPr id="5" name="Rectángulo 4">
+            <a:extLst>
+              <a:ext uri="{FF2B5EF4-FFF2-40B4-BE49-F238E27FC236}">
+                <a16:creationId xmlns:a16="http://schemas.microsoft.com/office/drawing/2014/main" id="{4207F05E-C65B-47B9-975E-33A0F1F9582F}"/>
               </a:ext>
             </a:extLst>
           </p:cNvPr>
@@ -3356,8 +3361,8 @@
         </p:nvSpPr>
         <p:spPr>
           <a:xfrm>
-            <a:off x="689113" y="781878"/>
-            <a:ext cx="2133600" cy="4094922"/>
+            <a:off x="689114" y="3692156"/>
+            <a:ext cx="2796207" cy="2588655"/>
           </a:xfrm>
           <a:prstGeom prst="rect">
             <a:avLst/>
@@ -3384,16 +3389,26 @@
           <a:lstStyle/>
           <a:p>
             <a:pPr algn="ctr"/>
-            <a:endParaRPr lang="es-MX"/>
-          </a:p>
-        </p:txBody>
-      </p:sp>
-      <p:sp>
-        <p:nvSpPr>
-          <p:cNvPr id="5" name="Rectángulo 4">
-            <a:extLst>
-              <a:ext uri="{FF2B5EF4-FFF2-40B4-BE49-F238E27FC236}">
-                <a16:creationId xmlns:a16="http://schemas.microsoft.com/office/drawing/2014/main" id="{4207F05E-C65B-47B9-975E-33A0F1F9582F}"/>
+            <a:r>
+              <a:rPr lang="es-MX" dirty="0"/>
+              <a:t>Gráfico País</a:t>
+            </a:r>
+          </a:p>
+          <a:p>
+            <a:pPr algn="ctr"/>
+            <a:r>
+              <a:rPr lang="es-MX" dirty="0"/>
+              <a:t>Mostrar gráfica del avance en la inoculación de la población hasta el día anterior</a:t>
+            </a:r>
+          </a:p>
+        </p:txBody>
+      </p:sp>
+      <p:sp>
+        <p:nvSpPr>
+          <p:cNvPr id="6" name="Rectángulo 5">
+            <a:extLst>
+              <a:ext uri="{FF2B5EF4-FFF2-40B4-BE49-F238E27FC236}">
+                <a16:creationId xmlns:a16="http://schemas.microsoft.com/office/drawing/2014/main" id="{4B04060E-96F9-4277-BB18-08B2E6F9C583}"/>
               </a:ext>
             </a:extLst>
           </p:cNvPr>
@@ -3402,8 +3417,8 @@
         </p:nvSpPr>
         <p:spPr>
           <a:xfrm>
-            <a:off x="3054625" y="781878"/>
-            <a:ext cx="2862469" cy="1855305"/>
+            <a:off x="3780573" y="301487"/>
+            <a:ext cx="4926108" cy="3276600"/>
           </a:xfrm>
           <a:prstGeom prst="rect">
             <a:avLst/>
@@ -3439,24 +3454,17 @@
             <a:pPr algn="ctr"/>
             <a:r>
               <a:rPr lang="es-MX" dirty="0"/>
-              <a:t>Mostrar gráfica de los</a:t>
-            </a:r>
-          </a:p>
-          <a:p>
-            <a:pPr algn="ctr"/>
-            <a:r>
-              <a:rPr lang="es-MX" dirty="0"/>
-              <a:t> status de recuperados y confirmados del día actual</a:t>
-            </a:r>
-          </a:p>
-        </p:txBody>
-      </p:sp>
-      <p:sp>
-        <p:nvSpPr>
-          <p:cNvPr id="6" name="Rectángulo 5">
-            <a:extLst>
-              <a:ext uri="{FF2B5EF4-FFF2-40B4-BE49-F238E27FC236}">
-                <a16:creationId xmlns:a16="http://schemas.microsoft.com/office/drawing/2014/main" id="{4B04060E-96F9-4277-BB18-08B2E6F9C583}"/>
+              <a:t>Mostrar gráfica del Status seleccionado para el periodo indicado </a:t>
+            </a:r>
+          </a:p>
+        </p:txBody>
+      </p:sp>
+      <p:sp>
+        <p:nvSpPr>
+          <p:cNvPr id="7" name="Rectángulo 6">
+            <a:extLst>
+              <a:ext uri="{FF2B5EF4-FFF2-40B4-BE49-F238E27FC236}">
+                <a16:creationId xmlns:a16="http://schemas.microsoft.com/office/drawing/2014/main" id="{E96B3DDE-4DFE-44CD-A3D2-E97A4067ACD9}"/>
               </a:ext>
             </a:extLst>
           </p:cNvPr>
@@ -3465,8 +3473,8 @@
         </p:nvSpPr>
         <p:spPr>
           <a:xfrm>
-            <a:off x="6115878" y="781878"/>
-            <a:ext cx="3021495" cy="1855305"/>
+            <a:off x="3780574" y="3692156"/>
+            <a:ext cx="4926108" cy="2588655"/>
           </a:xfrm>
           <a:prstGeom prst="rect">
             <a:avLst/>
@@ -3495,363 +3503,360 @@
             <a:pPr algn="ctr"/>
             <a:r>
               <a:rPr lang="es-MX" dirty="0"/>
-              <a:t>Gráfico País</a:t>
-            </a:r>
-          </a:p>
-          <a:p>
-            <a:pPr algn="ctr"/>
-            <a:r>
-              <a:rPr lang="es-MX" dirty="0"/>
-              <a:t>Mostrar gráfica de lo decesos del día actual  </a:t>
-            </a:r>
-          </a:p>
-        </p:txBody>
-      </p:sp>
-      <p:sp>
-        <p:nvSpPr>
-          <p:cNvPr id="7" name="Rectángulo 6">
-            <a:extLst>
-              <a:ext uri="{FF2B5EF4-FFF2-40B4-BE49-F238E27FC236}">
-                <a16:creationId xmlns:a16="http://schemas.microsoft.com/office/drawing/2014/main" id="{E96B3DDE-4DFE-44CD-A3D2-E97A4067ACD9}"/>
-              </a:ext>
-            </a:extLst>
-          </p:cNvPr>
-          <p:cNvSpPr/>
+              <a:t>Gráfica de la información por Status de forma detallada por Estado/Región para el periodo seleccionado</a:t>
+            </a:r>
+          </a:p>
+        </p:txBody>
+      </p:sp>
+      <p:grpSp>
+        <p:nvGrpSpPr>
+          <p:cNvPr id="2" name="Grupo 1">
+            <a:extLst>
+              <a:ext uri="{FF2B5EF4-FFF2-40B4-BE49-F238E27FC236}">
+                <a16:creationId xmlns:a16="http://schemas.microsoft.com/office/drawing/2014/main" id="{5589E69F-E9D5-4C8C-8F26-BE512FE69FEC}"/>
+              </a:ext>
+            </a:extLst>
+          </p:cNvPr>
+          <p:cNvGrpSpPr/>
+          <p:nvPr/>
+        </p:nvGrpSpPr>
+        <p:grpSpPr>
+          <a:xfrm>
+            <a:off x="689112" y="301487"/>
+            <a:ext cx="2796209" cy="3276600"/>
+            <a:chOff x="689113" y="781878"/>
+            <a:chExt cx="2133600" cy="4094922"/>
+          </a:xfrm>
+        </p:grpSpPr>
+        <p:sp>
+          <p:nvSpPr>
+            <p:cNvPr id="4" name="Rectángulo 3">
+              <a:extLst>
+                <a:ext uri="{FF2B5EF4-FFF2-40B4-BE49-F238E27FC236}">
+                  <a16:creationId xmlns:a16="http://schemas.microsoft.com/office/drawing/2014/main" id="{5C755673-F202-4B03-849F-035CFCF675CB}"/>
+                </a:ext>
+              </a:extLst>
+            </p:cNvPr>
+            <p:cNvSpPr/>
+            <p:nvPr/>
+          </p:nvSpPr>
+          <p:spPr>
+            <a:xfrm>
+              <a:off x="689113" y="781878"/>
+              <a:ext cx="2133600" cy="4094922"/>
+            </a:xfrm>
+            <a:prstGeom prst="rect">
+              <a:avLst/>
+            </a:prstGeom>
+          </p:spPr>
+          <p:style>
+            <a:lnRef idx="2">
+              <a:schemeClr val="accent1">
+                <a:shade val="50000"/>
+              </a:schemeClr>
+            </a:lnRef>
+            <a:fillRef idx="1">
+              <a:schemeClr val="accent1"/>
+            </a:fillRef>
+            <a:effectRef idx="0">
+              <a:schemeClr val="accent1"/>
+            </a:effectRef>
+            <a:fontRef idx="minor">
+              <a:schemeClr val="lt1"/>
+            </a:fontRef>
+          </p:style>
+          <p:txBody>
+            <a:bodyPr rtlCol="0" anchor="ctr"/>
+            <a:lstStyle/>
+            <a:p>
+              <a:pPr algn="ctr"/>
+              <a:endParaRPr lang="es-MX"/>
+            </a:p>
+          </p:txBody>
+        </p:sp>
+        <p:sp>
+          <p:nvSpPr>
+            <p:cNvPr id="8" name="Rectángulo 7">
+              <a:extLst>
+                <a:ext uri="{FF2B5EF4-FFF2-40B4-BE49-F238E27FC236}">
+                  <a16:creationId xmlns:a16="http://schemas.microsoft.com/office/drawing/2014/main" id="{BB1D4889-8F43-4B31-8944-0748747A4F1B}"/>
+                </a:ext>
+              </a:extLst>
+            </p:cNvPr>
+            <p:cNvSpPr/>
+            <p:nvPr/>
+          </p:nvSpPr>
+          <p:spPr>
+            <a:xfrm>
+              <a:off x="901148" y="1126434"/>
+              <a:ext cx="1563756" cy="914401"/>
+            </a:xfrm>
+            <a:prstGeom prst="rect">
+              <a:avLst/>
+            </a:prstGeom>
+          </p:spPr>
+          <p:style>
+            <a:lnRef idx="2">
+              <a:schemeClr val="accent6"/>
+            </a:lnRef>
+            <a:fillRef idx="1">
+              <a:schemeClr val="lt1"/>
+            </a:fillRef>
+            <a:effectRef idx="0">
+              <a:schemeClr val="accent6"/>
+            </a:effectRef>
+            <a:fontRef idx="minor">
+              <a:schemeClr val="dk1"/>
+            </a:fontRef>
+          </p:style>
+          <p:txBody>
+            <a:bodyPr rtlCol="0" anchor="ctr"/>
+            <a:lstStyle/>
+            <a:p>
+              <a:pPr algn="ctr"/>
+              <a:r>
+                <a:rPr lang="es-MX" b="1" dirty="0"/>
+                <a:t>País</a:t>
+              </a:r>
+            </a:p>
+            <a:p>
+              <a:pPr algn="ctr"/>
+              <a:r>
+                <a:rPr lang="es-MX" sz="1200" dirty="0"/>
+                <a:t>Generar lista de países</a:t>
+              </a:r>
+            </a:p>
+          </p:txBody>
+        </p:sp>
+        <p:sp>
+          <p:nvSpPr>
+            <p:cNvPr id="9" name="Rectángulo 8">
+              <a:extLst>
+                <a:ext uri="{FF2B5EF4-FFF2-40B4-BE49-F238E27FC236}">
+                  <a16:creationId xmlns:a16="http://schemas.microsoft.com/office/drawing/2014/main" id="{21A4C33A-5C6A-415F-B21B-0C0BED43ECBB}"/>
+                </a:ext>
+              </a:extLst>
+            </p:cNvPr>
+            <p:cNvSpPr/>
+            <p:nvPr/>
+          </p:nvSpPr>
+          <p:spPr>
+            <a:xfrm>
+              <a:off x="914400" y="2292627"/>
+              <a:ext cx="1550504" cy="1099928"/>
+            </a:xfrm>
+            <a:prstGeom prst="rect">
+              <a:avLst/>
+            </a:prstGeom>
+          </p:spPr>
+          <p:style>
+            <a:lnRef idx="2">
+              <a:schemeClr val="accent6"/>
+            </a:lnRef>
+            <a:fillRef idx="1">
+              <a:schemeClr val="lt1"/>
+            </a:fillRef>
+            <a:effectRef idx="0">
+              <a:schemeClr val="accent6"/>
+            </a:effectRef>
+            <a:fontRef idx="minor">
+              <a:schemeClr val="dk1"/>
+            </a:fontRef>
+          </p:style>
+          <p:txBody>
+            <a:bodyPr rtlCol="0" anchor="ctr"/>
+            <a:lstStyle/>
+            <a:p>
+              <a:pPr algn="ctr"/>
+              <a:r>
+                <a:rPr lang="es-MX" b="1" dirty="0"/>
+                <a:t>Status</a:t>
+              </a:r>
+            </a:p>
+            <a:p>
+              <a:pPr algn="ctr"/>
+              <a:r>
+                <a:rPr lang="es-MX" sz="1200" dirty="0"/>
+                <a:t>Recuperados</a:t>
+              </a:r>
+            </a:p>
+            <a:p>
+              <a:pPr algn="ctr"/>
+              <a:r>
+                <a:rPr lang="es-MX" sz="1200" dirty="0"/>
+                <a:t>Confirmados</a:t>
+              </a:r>
+            </a:p>
+            <a:p>
+              <a:pPr algn="ctr"/>
+              <a:r>
+                <a:rPr lang="es-MX" sz="1200" dirty="0"/>
+                <a:t>Decesos</a:t>
+              </a:r>
+            </a:p>
+          </p:txBody>
+        </p:sp>
+        <p:sp>
+          <p:nvSpPr>
+            <p:cNvPr id="10" name="Rectángulo: esquinas redondeadas 9">
+              <a:extLst>
+                <a:ext uri="{FF2B5EF4-FFF2-40B4-BE49-F238E27FC236}">
+                  <a16:creationId xmlns:a16="http://schemas.microsoft.com/office/drawing/2014/main" id="{7E5F8D86-DC5C-47DC-BDA2-F79A19907DDF}"/>
+                </a:ext>
+              </a:extLst>
+            </p:cNvPr>
+            <p:cNvSpPr/>
+            <p:nvPr/>
+          </p:nvSpPr>
+          <p:spPr>
+            <a:xfrm>
+              <a:off x="1192695" y="4439477"/>
+              <a:ext cx="1007165" cy="331304"/>
+            </a:xfrm>
+            <a:prstGeom prst="roundRect">
+              <a:avLst/>
+            </a:prstGeom>
+          </p:spPr>
+          <p:style>
+            <a:lnRef idx="2">
+              <a:schemeClr val="dk1">
+                <a:shade val="50000"/>
+              </a:schemeClr>
+            </a:lnRef>
+            <a:fillRef idx="1">
+              <a:schemeClr val="dk1"/>
+            </a:fillRef>
+            <a:effectRef idx="0">
+              <a:schemeClr val="dk1"/>
+            </a:effectRef>
+            <a:fontRef idx="minor">
+              <a:schemeClr val="lt1"/>
+            </a:fontRef>
+          </p:style>
+          <p:txBody>
+            <a:bodyPr rtlCol="0" anchor="ctr"/>
+            <a:lstStyle/>
+            <a:p>
+              <a:pPr algn="ctr"/>
+              <a:r>
+                <a:rPr lang="es-MX" dirty="0" err="1"/>
+                <a:t>Search</a:t>
+              </a:r>
+              <a:endParaRPr lang="es-MX" dirty="0"/>
+            </a:p>
+          </p:txBody>
+        </p:sp>
+        <p:sp>
+          <p:nvSpPr>
+            <p:cNvPr id="11" name="Rectángulo 10">
+              <a:extLst>
+                <a:ext uri="{FF2B5EF4-FFF2-40B4-BE49-F238E27FC236}">
+                  <a16:creationId xmlns:a16="http://schemas.microsoft.com/office/drawing/2014/main" id="{5F9612A5-DBEF-4F60-B75B-79E926889F73}"/>
+                </a:ext>
+              </a:extLst>
+            </p:cNvPr>
+            <p:cNvSpPr/>
+            <p:nvPr/>
+          </p:nvSpPr>
+          <p:spPr>
+            <a:xfrm>
+              <a:off x="914400" y="3498575"/>
+              <a:ext cx="1550504" cy="331304"/>
+            </a:xfrm>
+            <a:prstGeom prst="rect">
+              <a:avLst/>
+            </a:prstGeom>
+          </p:spPr>
+          <p:style>
+            <a:lnRef idx="2">
+              <a:schemeClr val="accent6"/>
+            </a:lnRef>
+            <a:fillRef idx="1">
+              <a:schemeClr val="lt1"/>
+            </a:fillRef>
+            <a:effectRef idx="0">
+              <a:schemeClr val="accent6"/>
+            </a:effectRef>
+            <a:fontRef idx="minor">
+              <a:schemeClr val="dk1"/>
+            </a:fontRef>
+          </p:style>
+          <p:txBody>
+            <a:bodyPr rtlCol="0" anchor="ctr"/>
+            <a:lstStyle/>
+            <a:p>
+              <a:pPr algn="ctr"/>
+              <a:r>
+                <a:rPr lang="es-MX" b="1" dirty="0"/>
+                <a:t>Fecha Inicial</a:t>
+              </a:r>
+            </a:p>
+          </p:txBody>
+        </p:sp>
+        <p:sp>
+          <p:nvSpPr>
+            <p:cNvPr id="12" name="Rectángulo 11">
+              <a:extLst>
+                <a:ext uri="{FF2B5EF4-FFF2-40B4-BE49-F238E27FC236}">
+                  <a16:creationId xmlns:a16="http://schemas.microsoft.com/office/drawing/2014/main" id="{738F890F-BE0A-4373-BCD1-FFF764661123}"/>
+                </a:ext>
+              </a:extLst>
+            </p:cNvPr>
+            <p:cNvSpPr/>
+            <p:nvPr/>
+          </p:nvSpPr>
+          <p:spPr>
+            <a:xfrm>
+              <a:off x="907775" y="3942519"/>
+              <a:ext cx="1550504" cy="331304"/>
+            </a:xfrm>
+            <a:prstGeom prst="rect">
+              <a:avLst/>
+            </a:prstGeom>
+          </p:spPr>
+          <p:style>
+            <a:lnRef idx="2">
+              <a:schemeClr val="accent6"/>
+            </a:lnRef>
+            <a:fillRef idx="1">
+              <a:schemeClr val="lt1"/>
+            </a:fillRef>
+            <a:effectRef idx="0">
+              <a:schemeClr val="accent6"/>
+            </a:effectRef>
+            <a:fontRef idx="minor">
+              <a:schemeClr val="dk1"/>
+            </a:fontRef>
+          </p:style>
+          <p:txBody>
+            <a:bodyPr rtlCol="0" anchor="ctr"/>
+            <a:lstStyle/>
+            <a:p>
+              <a:pPr algn="ctr"/>
+              <a:r>
+                <a:rPr lang="es-MX" b="1" dirty="0"/>
+                <a:t>Fecha Final</a:t>
+              </a:r>
+            </a:p>
+          </p:txBody>
+        </p:sp>
+      </p:grpSp>
+      <p:sp>
+        <p:nvSpPr>
+          <p:cNvPr id="13" name="CuadroTexto 12">
+            <a:extLst>
+              <a:ext uri="{FF2B5EF4-FFF2-40B4-BE49-F238E27FC236}">
+                <a16:creationId xmlns:a16="http://schemas.microsoft.com/office/drawing/2014/main" id="{A4280607-38D9-49B9-A625-545D35BBFCEF}"/>
+              </a:ext>
+            </a:extLst>
+          </p:cNvPr>
+          <p:cNvSpPr txBox="1"/>
           <p:nvPr/>
         </p:nvSpPr>
         <p:spPr>
           <a:xfrm>
-            <a:off x="3054626" y="2822713"/>
-            <a:ext cx="6082747" cy="2054087"/>
-          </a:xfrm>
-          <a:prstGeom prst="rect">
-            <a:avLst/>
-          </a:prstGeom>
-        </p:spPr>
-        <p:style>
-          <a:lnRef idx="2">
-            <a:schemeClr val="accent1">
-              <a:shade val="50000"/>
-            </a:schemeClr>
-          </a:lnRef>
-          <a:fillRef idx="1">
-            <a:schemeClr val="accent1"/>
-          </a:fillRef>
-          <a:effectRef idx="0">
-            <a:schemeClr val="accent1"/>
-          </a:effectRef>
-          <a:fontRef idx="minor">
-            <a:schemeClr val="lt1"/>
-          </a:fontRef>
-        </p:style>
-        <p:txBody>
-          <a:bodyPr rtlCol="0" anchor="ctr"/>
-          <a:lstStyle/>
-          <a:p>
-            <a:pPr algn="ctr"/>
-            <a:r>
-              <a:rPr lang="es-MX" dirty="0"/>
-              <a:t>Gráfica histórica 15 días</a:t>
-            </a:r>
-          </a:p>
-          <a:p>
-            <a:pPr algn="ctr"/>
-            <a:r>
-              <a:rPr lang="es-MX" dirty="0"/>
-              <a:t>Mostrar gráfica de todos los</a:t>
-            </a:r>
-          </a:p>
-          <a:p>
-            <a:pPr algn="ctr"/>
-            <a:r>
-              <a:rPr lang="es-MX" dirty="0"/>
-              <a:t>Status</a:t>
-            </a:r>
-          </a:p>
-        </p:txBody>
-      </p:sp>
-      <p:sp>
-        <p:nvSpPr>
-          <p:cNvPr id="8" name="Rectángulo 7">
-            <a:extLst>
-              <a:ext uri="{FF2B5EF4-FFF2-40B4-BE49-F238E27FC236}">
-                <a16:creationId xmlns:a16="http://schemas.microsoft.com/office/drawing/2014/main" id="{BB1D4889-8F43-4B31-8944-0748747A4F1B}"/>
-              </a:ext>
-            </a:extLst>
-          </p:cNvPr>
-          <p:cNvSpPr/>
-          <p:nvPr/>
-        </p:nvSpPr>
-        <p:spPr>
-          <a:xfrm>
-            <a:off x="901148" y="1126434"/>
-            <a:ext cx="1563756" cy="914401"/>
-          </a:xfrm>
-          <a:prstGeom prst="rect">
-            <a:avLst/>
-          </a:prstGeom>
-        </p:spPr>
-        <p:style>
-          <a:lnRef idx="2">
-            <a:schemeClr val="accent6"/>
-          </a:lnRef>
-          <a:fillRef idx="1">
-            <a:schemeClr val="lt1"/>
-          </a:fillRef>
-          <a:effectRef idx="0">
-            <a:schemeClr val="accent6"/>
-          </a:effectRef>
-          <a:fontRef idx="minor">
-            <a:schemeClr val="dk1"/>
-          </a:fontRef>
-        </p:style>
-        <p:txBody>
-          <a:bodyPr rtlCol="0" anchor="ctr"/>
-          <a:lstStyle/>
-          <a:p>
-            <a:pPr algn="ctr"/>
-            <a:r>
-              <a:rPr lang="es-MX" b="1" dirty="0"/>
-              <a:t>País</a:t>
-            </a:r>
-          </a:p>
-          <a:p>
-            <a:pPr algn="ctr"/>
-            <a:r>
-              <a:rPr lang="es-MX" dirty="0"/>
-              <a:t>Generar lista de países</a:t>
-            </a:r>
-          </a:p>
-        </p:txBody>
-      </p:sp>
-      <p:sp>
-        <p:nvSpPr>
-          <p:cNvPr id="9" name="Rectángulo 8">
-            <a:extLst>
-              <a:ext uri="{FF2B5EF4-FFF2-40B4-BE49-F238E27FC236}">
-                <a16:creationId xmlns:a16="http://schemas.microsoft.com/office/drawing/2014/main" id="{21A4C33A-5C6A-415F-B21B-0C0BED43ECBB}"/>
-              </a:ext>
-            </a:extLst>
-          </p:cNvPr>
-          <p:cNvSpPr/>
-          <p:nvPr/>
-        </p:nvSpPr>
-        <p:spPr>
-          <a:xfrm>
-            <a:off x="914400" y="2292627"/>
-            <a:ext cx="1550504" cy="1099928"/>
-          </a:xfrm>
-          <a:prstGeom prst="rect">
-            <a:avLst/>
-          </a:prstGeom>
-        </p:spPr>
-        <p:style>
-          <a:lnRef idx="2">
-            <a:schemeClr val="accent6"/>
-          </a:lnRef>
-          <a:fillRef idx="1">
-            <a:schemeClr val="lt1"/>
-          </a:fillRef>
-          <a:effectRef idx="0">
-            <a:schemeClr val="accent6"/>
-          </a:effectRef>
-          <a:fontRef idx="minor">
-            <a:schemeClr val="dk1"/>
-          </a:fontRef>
-        </p:style>
-        <p:txBody>
-          <a:bodyPr rtlCol="0" anchor="ctr"/>
-          <a:lstStyle/>
-          <a:p>
-            <a:pPr algn="ctr"/>
-            <a:r>
-              <a:rPr lang="es-MX" b="1" dirty="0"/>
-              <a:t>Status</a:t>
-            </a:r>
-          </a:p>
-          <a:p>
-            <a:pPr algn="ctr"/>
-            <a:r>
-              <a:rPr lang="es-MX" dirty="0"/>
-              <a:t>Recuperados</a:t>
-            </a:r>
-          </a:p>
-          <a:p>
-            <a:pPr algn="ctr"/>
-            <a:r>
-              <a:rPr lang="es-MX" dirty="0"/>
-              <a:t>Confirmados</a:t>
-            </a:r>
-          </a:p>
-          <a:p>
-            <a:pPr algn="ctr"/>
-            <a:r>
-              <a:rPr lang="es-MX" dirty="0"/>
-              <a:t>Decesos</a:t>
-            </a:r>
-          </a:p>
-        </p:txBody>
-      </p:sp>
-      <p:sp>
-        <p:nvSpPr>
-          <p:cNvPr id="10" name="Rectángulo: esquinas redondeadas 9">
-            <a:extLst>
-              <a:ext uri="{FF2B5EF4-FFF2-40B4-BE49-F238E27FC236}">
-                <a16:creationId xmlns:a16="http://schemas.microsoft.com/office/drawing/2014/main" id="{7E5F8D86-DC5C-47DC-BDA2-F79A19907DDF}"/>
-              </a:ext>
-            </a:extLst>
-          </p:cNvPr>
-          <p:cNvSpPr/>
-          <p:nvPr/>
-        </p:nvSpPr>
-        <p:spPr>
-          <a:xfrm>
-            <a:off x="1192695" y="4439477"/>
-            <a:ext cx="1007165" cy="331304"/>
-          </a:xfrm>
-          <a:prstGeom prst="roundRect">
-            <a:avLst/>
-          </a:prstGeom>
-        </p:spPr>
-        <p:style>
-          <a:lnRef idx="2">
-            <a:schemeClr val="dk1">
-              <a:shade val="50000"/>
-            </a:schemeClr>
-          </a:lnRef>
-          <a:fillRef idx="1">
-            <a:schemeClr val="dk1"/>
-          </a:fillRef>
-          <a:effectRef idx="0">
-            <a:schemeClr val="dk1"/>
-          </a:effectRef>
-          <a:fontRef idx="minor">
-            <a:schemeClr val="lt1"/>
-          </a:fontRef>
-        </p:style>
-        <p:txBody>
-          <a:bodyPr rtlCol="0" anchor="ctr"/>
-          <a:lstStyle/>
-          <a:p>
-            <a:pPr algn="ctr"/>
-            <a:r>
-              <a:rPr lang="es-MX" dirty="0" err="1"/>
-              <a:t>Search</a:t>
-            </a:r>
-            <a:endParaRPr lang="es-MX" dirty="0"/>
-          </a:p>
-        </p:txBody>
-      </p:sp>
-      <p:sp>
-        <p:nvSpPr>
-          <p:cNvPr id="11" name="Rectángulo 10">
-            <a:extLst>
-              <a:ext uri="{FF2B5EF4-FFF2-40B4-BE49-F238E27FC236}">
-                <a16:creationId xmlns:a16="http://schemas.microsoft.com/office/drawing/2014/main" id="{5F9612A5-DBEF-4F60-B75B-79E926889F73}"/>
-              </a:ext>
-            </a:extLst>
-          </p:cNvPr>
-          <p:cNvSpPr/>
-          <p:nvPr/>
-        </p:nvSpPr>
-        <p:spPr>
-          <a:xfrm>
-            <a:off x="914400" y="3498575"/>
-            <a:ext cx="1550504" cy="331304"/>
-          </a:xfrm>
-          <a:prstGeom prst="rect">
-            <a:avLst/>
-          </a:prstGeom>
-        </p:spPr>
-        <p:style>
-          <a:lnRef idx="2">
-            <a:schemeClr val="accent6"/>
-          </a:lnRef>
-          <a:fillRef idx="1">
-            <a:schemeClr val="lt1"/>
-          </a:fillRef>
-          <a:effectRef idx="0">
-            <a:schemeClr val="accent6"/>
-          </a:effectRef>
-          <a:fontRef idx="minor">
-            <a:schemeClr val="dk1"/>
-          </a:fontRef>
-        </p:style>
-        <p:txBody>
-          <a:bodyPr rtlCol="0" anchor="ctr"/>
-          <a:lstStyle/>
-          <a:p>
-            <a:pPr algn="ctr"/>
-            <a:r>
-              <a:rPr lang="es-MX" b="1" dirty="0"/>
-              <a:t>Fecha Inicial</a:t>
-            </a:r>
-          </a:p>
-        </p:txBody>
-      </p:sp>
-      <p:sp>
-        <p:nvSpPr>
-          <p:cNvPr id="12" name="Rectángulo 11">
-            <a:extLst>
-              <a:ext uri="{FF2B5EF4-FFF2-40B4-BE49-F238E27FC236}">
-                <a16:creationId xmlns:a16="http://schemas.microsoft.com/office/drawing/2014/main" id="{738F890F-BE0A-4373-BCD1-FFF764661123}"/>
-              </a:ext>
-            </a:extLst>
-          </p:cNvPr>
-          <p:cNvSpPr/>
-          <p:nvPr/>
-        </p:nvSpPr>
-        <p:spPr>
-          <a:xfrm>
-            <a:off x="907775" y="3942519"/>
-            <a:ext cx="1550504" cy="331304"/>
-          </a:xfrm>
-          <a:prstGeom prst="rect">
-            <a:avLst/>
-          </a:prstGeom>
-        </p:spPr>
-        <p:style>
-          <a:lnRef idx="2">
-            <a:schemeClr val="accent6"/>
-          </a:lnRef>
-          <a:fillRef idx="1">
-            <a:schemeClr val="lt1"/>
-          </a:fillRef>
-          <a:effectRef idx="0">
-            <a:schemeClr val="accent6"/>
-          </a:effectRef>
-          <a:fontRef idx="minor">
-            <a:schemeClr val="dk1"/>
-          </a:fontRef>
-        </p:style>
-        <p:txBody>
-          <a:bodyPr rtlCol="0" anchor="ctr"/>
-          <a:lstStyle/>
-          <a:p>
-            <a:pPr algn="ctr"/>
-            <a:r>
-              <a:rPr lang="es-MX" b="1" dirty="0"/>
-              <a:t>Fecha Final</a:t>
-            </a:r>
-          </a:p>
-        </p:txBody>
-      </p:sp>
-      <p:sp>
-        <p:nvSpPr>
-          <p:cNvPr id="13" name="CuadroTexto 12">
-            <a:extLst>
-              <a:ext uri="{FF2B5EF4-FFF2-40B4-BE49-F238E27FC236}">
-                <a16:creationId xmlns:a16="http://schemas.microsoft.com/office/drawing/2014/main" id="{A4280607-38D9-49B9-A625-545D35BBFCEF}"/>
-              </a:ext>
-            </a:extLst>
-          </p:cNvPr>
-          <p:cNvSpPr txBox="1"/>
-          <p:nvPr/>
-        </p:nvSpPr>
-        <p:spPr>
-          <a:xfrm>
-            <a:off x="689113" y="5128592"/>
-            <a:ext cx="6367321" cy="1200329"/>
+            <a:off x="9039834" y="462458"/>
+            <a:ext cx="2675088" cy="2031325"/>
           </a:xfrm>
           <a:prstGeom prst="rect">
             <a:avLst/>
@@ -3859,7 +3864,7 @@
           <a:noFill/>
         </p:spPr>
         <p:txBody>
-          <a:bodyPr wrap="none" rtlCol="0">
+          <a:bodyPr wrap="square" rtlCol="0">
             <a:spAutoFit/>
           </a:bodyPr>
           <a:lstStyle/>
@@ -3880,8 +3885,13 @@
             </a:r>
             <a:r>
               <a:rPr lang="es-MX" dirty="0"/>
-              <a:t> Bootstrap</a:t>
-            </a:r>
+              <a:t> Bootstrap/</a:t>
+            </a:r>
+            <a:r>
+              <a:rPr lang="es-MX" dirty="0" err="1"/>
+              <a:t>Bulma</a:t>
+            </a:r>
+            <a:endParaRPr lang="es-MX" dirty="0"/>
           </a:p>
           <a:p>
             <a:r>

</xml_diff>